<commit_message>
fix failing unit tests
</commit_message>
<xml_diff>
--- a/_unittests/ut_mokadi/data/simple.pptx
+++ b/_unittests/ut_mokadi/data/simple.pptx
@@ -242,7 +242,7 @@
           <a:p>
             <a:fld id="{554F79A8-EDED-4348-8A8C-AFD32DCCE4C9}" type="datetimeFigureOut">
               <a:rPr lang="fr-FR" smtClean="0"/>
-              <a:t>02/04/2017</a:t>
+              <a:t>03/04/2017</a:t>
             </a:fld>
             <a:endParaRPr lang="fr-FR"/>
           </a:p>
@@ -410,7 +410,7 @@
           <a:p>
             <a:fld id="{554F79A8-EDED-4348-8A8C-AFD32DCCE4C9}" type="datetimeFigureOut">
               <a:rPr lang="fr-FR" smtClean="0"/>
-              <a:t>02/04/2017</a:t>
+              <a:t>03/04/2017</a:t>
             </a:fld>
             <a:endParaRPr lang="fr-FR"/>
           </a:p>
@@ -588,7 +588,7 @@
           <a:p>
             <a:fld id="{554F79A8-EDED-4348-8A8C-AFD32DCCE4C9}" type="datetimeFigureOut">
               <a:rPr lang="fr-FR" smtClean="0"/>
-              <a:t>02/04/2017</a:t>
+              <a:t>03/04/2017</a:t>
             </a:fld>
             <a:endParaRPr lang="fr-FR"/>
           </a:p>
@@ -756,7 +756,7 @@
           <a:p>
             <a:fld id="{554F79A8-EDED-4348-8A8C-AFD32DCCE4C9}" type="datetimeFigureOut">
               <a:rPr lang="fr-FR" smtClean="0"/>
-              <a:t>02/04/2017</a:t>
+              <a:t>03/04/2017</a:t>
             </a:fld>
             <a:endParaRPr lang="fr-FR"/>
           </a:p>
@@ -1001,7 +1001,7 @@
           <a:p>
             <a:fld id="{554F79A8-EDED-4348-8A8C-AFD32DCCE4C9}" type="datetimeFigureOut">
               <a:rPr lang="fr-FR" smtClean="0"/>
-              <a:t>02/04/2017</a:t>
+              <a:t>03/04/2017</a:t>
             </a:fld>
             <a:endParaRPr lang="fr-FR"/>
           </a:p>
@@ -1230,7 +1230,7 @@
           <a:p>
             <a:fld id="{554F79A8-EDED-4348-8A8C-AFD32DCCE4C9}" type="datetimeFigureOut">
               <a:rPr lang="fr-FR" smtClean="0"/>
-              <a:t>02/04/2017</a:t>
+              <a:t>03/04/2017</a:t>
             </a:fld>
             <a:endParaRPr lang="fr-FR"/>
           </a:p>
@@ -1594,7 +1594,7 @@
           <a:p>
             <a:fld id="{554F79A8-EDED-4348-8A8C-AFD32DCCE4C9}" type="datetimeFigureOut">
               <a:rPr lang="fr-FR" smtClean="0"/>
-              <a:t>02/04/2017</a:t>
+              <a:t>03/04/2017</a:t>
             </a:fld>
             <a:endParaRPr lang="fr-FR"/>
           </a:p>
@@ -1711,7 +1711,7 @@
           <a:p>
             <a:fld id="{554F79A8-EDED-4348-8A8C-AFD32DCCE4C9}" type="datetimeFigureOut">
               <a:rPr lang="fr-FR" smtClean="0"/>
-              <a:t>02/04/2017</a:t>
+              <a:t>03/04/2017</a:t>
             </a:fld>
             <a:endParaRPr lang="fr-FR"/>
           </a:p>
@@ -1806,7 +1806,7 @@
           <a:p>
             <a:fld id="{554F79A8-EDED-4348-8A8C-AFD32DCCE4C9}" type="datetimeFigureOut">
               <a:rPr lang="fr-FR" smtClean="0"/>
-              <a:t>02/04/2017</a:t>
+              <a:t>03/04/2017</a:t>
             </a:fld>
             <a:endParaRPr lang="fr-FR"/>
           </a:p>
@@ -2081,7 +2081,7 @@
           <a:p>
             <a:fld id="{554F79A8-EDED-4348-8A8C-AFD32DCCE4C9}" type="datetimeFigureOut">
               <a:rPr lang="fr-FR" smtClean="0"/>
-              <a:t>02/04/2017</a:t>
+              <a:t>03/04/2017</a:t>
             </a:fld>
             <a:endParaRPr lang="fr-FR"/>
           </a:p>
@@ -2333,7 +2333,7 @@
           <a:p>
             <a:fld id="{554F79A8-EDED-4348-8A8C-AFD32DCCE4C9}" type="datetimeFigureOut">
               <a:rPr lang="fr-FR" smtClean="0"/>
-              <a:t>02/04/2017</a:t>
+              <a:t>03/04/2017</a:t>
             </a:fld>
             <a:endParaRPr lang="fr-FR"/>
           </a:p>
@@ -2544,7 +2544,7 @@
           <a:p>
             <a:fld id="{554F79A8-EDED-4348-8A8C-AFD32DCCE4C9}" type="datetimeFigureOut">
               <a:rPr lang="fr-FR" smtClean="0"/>
-              <a:t>02/04/2017</a:t>
+              <a:t>03/04/2017</a:t>
             </a:fld>
             <a:endParaRPr lang="fr-FR"/>
           </a:p>
@@ -3062,18 +3062,17 @@
           <a:p>
             <a:r>
               <a:rPr lang="fr-FR" dirty="0"/>
-              <a:t>Cela sera très </a:t>
-            </a:r>
-            <a:r>
-              <a:rPr lang="fr-FR"/>
-              <a:t>vite terminé.</a:t>
-            </a:r>
-            <a:endParaRPr lang="fr-FR" dirty="0"/>
-          </a:p>
-          <a:p>
+              <a:t>Cela sera très vite terminé.</a:t>
+            </a:r>
+          </a:p>
+          <a:p>
+            <a:r>
+              <a:rPr lang="fr-FR"/>
+              <a:t>Ceci est </a:t>
+            </a:r>
             <a:r>
               <a:rPr lang="fr-FR" dirty="0"/>
-              <a:t>C’est une petite présentation en exemple. </a:t>
+              <a:t>une petite présentation en exemple. </a:t>
             </a:r>
           </a:p>
           <a:p>

</xml_diff>